<commit_message>
Fix Unicode character bug
</commit_message>
<xml_diff>
--- a/Anleitungen/Python.pptx
+++ b/Anleitungen/Python.pptx
@@ -389,7 +389,7 @@
           <a:p>
             <a:fld id="{FC467CC9-39D6-4C14-8FF0-DC490C2A5864}" type="datetimeFigureOut">
               <a:rPr lang="de-DE" smtClean="0"/>
-              <a:t>20.02.2017</a:t>
+              <a:t>23.02.2018</a:t>
             </a:fld>
             <a:endParaRPr lang="de-DE" dirty="0"/>
           </a:p>
@@ -3983,11 +3983,7 @@
           <a:p>
             <a:r>
               <a:rPr lang="de-DE" dirty="0" smtClean="0"/>
-              <a:t>Python 2 und 3 bereits </a:t>
-            </a:r>
-            <a:r>
-              <a:rPr lang="de-DE" dirty="0" smtClean="0"/>
-              <a:t>installiert</a:t>
+              <a:t>Python 2 und 3 bereits installiert</a:t>
             </a:r>
             <a:endParaRPr lang="de-DE" dirty="0"/>
           </a:p>
@@ -4763,13 +4759,8 @@
             </a:r>
             <a:r>
               <a:rPr lang="de-DE" dirty="0" smtClean="0"/>
-              <a:t> Learning Environment</a:t>
-            </a:r>
-            <a:r>
-              <a:rPr lang="de-DE" dirty="0" smtClean="0"/>
-              <a:t>)</a:t>
-            </a:r>
-            <a:endParaRPr lang="de-DE" dirty="0" smtClean="0"/>
+              <a:t> Learning Environment)</a:t>
+            </a:r>
           </a:p>
         </p:txBody>
       </p:sp>
@@ -4941,7 +4932,6 @@
               <a:rPr lang="de-DE" dirty="0" smtClean="0"/>
               <a:t>Windows</a:t>
             </a:r>
-            <a:endParaRPr lang="de-DE" dirty="0" smtClean="0"/>
           </a:p>
           <a:p>
             <a:pPr lvl="1"/>
@@ -5289,7 +5279,6 @@
               <a:rPr lang="de-DE" dirty="0" smtClean="0"/>
               <a:t>Windows</a:t>
             </a:r>
-            <a:endParaRPr lang="de-DE" dirty="0" smtClean="0"/>
           </a:p>
           <a:p>
             <a:pPr lvl="1"/>
@@ -6335,7 +6324,6 @@
               <a:rPr lang="de-DE" dirty="0" smtClean="0"/>
               <a:t>Installation von Python</a:t>
             </a:r>
-            <a:endParaRPr lang="de-DE" dirty="0" smtClean="0"/>
           </a:p>
           <a:p>
             <a:r>
@@ -7139,11 +7127,7 @@
           <a:p>
             <a:r>
               <a:rPr lang="de-DE" dirty="0" smtClean="0"/>
-              <a:t>Erweiterte </a:t>
-            </a:r>
-            <a:r>
-              <a:rPr lang="de-DE" dirty="0" smtClean="0"/>
-              <a:t>Rechenoperationen</a:t>
+              <a:t>Erweiterte Rechenoperationen</a:t>
             </a:r>
           </a:p>
           <a:p>
@@ -7183,7 +7167,6 @@
               <a:rPr lang="de-DE" dirty="0" smtClean="0"/>
               <a:t>, z.B. 5%2 = 1</a:t>
             </a:r>
-            <a:endParaRPr lang="de-DE" dirty="0" smtClean="0"/>
           </a:p>
           <a:p>
             <a:pPr lvl="1"/>
@@ -7562,7 +7545,6 @@
               <a:rPr lang="de-DE" dirty="0" smtClean="0"/>
               <a:t>ubtraktion</a:t>
             </a:r>
-            <a:endParaRPr lang="de-DE" dirty="0" smtClean="0"/>
           </a:p>
           <a:p>
             <a:r>
@@ -7834,11 +7816,7 @@
             <a:pPr lvl="1"/>
             <a:r>
               <a:rPr lang="de-DE" dirty="0" smtClean="0"/>
-              <a:t>Selten:</a:t>
-            </a:r>
-            <a:r>
-              <a:rPr lang="de-DE" dirty="0" smtClean="0"/>
-              <a:t> </a:t>
+              <a:t>Selten: </a:t>
             </a:r>
             <a:r>
               <a:rPr lang="de-DE" dirty="0" smtClean="0">
@@ -9205,35 +9183,52 @@
                   <a:srgbClr val="F37637"/>
                 </a:solidFill>
               </a:rPr>
-              <a:t>xh</a:t>
-            </a:r>
-            <a:r>
-              <a:rPr lang="de-DE" dirty="0" smtClean="0">
-                <a:solidFill>
-                  <a:srgbClr val="F37637"/>
-                </a:solidFill>
-              </a:rPr>
-              <a:t>…h</a:t>
+              <a:t>u</a:t>
+            </a:r>
+            <a:r>
+              <a:rPr lang="de-DE" dirty="0" err="1" smtClean="0">
+                <a:solidFill>
+                  <a:srgbClr val="F37637"/>
+                </a:solidFill>
+              </a:rPr>
+              <a:t>hhhh</a:t>
             </a:r>
             <a:r>
               <a:rPr lang="de-DE" dirty="0" smtClean="0"/>
               <a:t> </a:t>
             </a:r>
+            <a:r>
+              <a:rPr lang="de-DE" dirty="0" smtClean="0"/>
+              <a:t/>
+            </a:r>
             <a:br>
               <a:rPr lang="de-DE" dirty="0" smtClean="0"/>
             </a:br>
             <a:r>
               <a:rPr lang="de-DE" dirty="0" smtClean="0"/>
-              <a:t>(wobei </a:t>
+              <a:t>(</a:t>
             </a:r>
             <a:r>
               <a:rPr lang="de-DE" dirty="0" err="1" smtClean="0"/>
-              <a:t>hh</a:t>
-            </a:r>
-            <a:r>
-              <a:rPr lang="de-DE" dirty="0" smtClean="0"/>
-              <a:t> durch die hexadezimale Zahl aus der Tabelle ersetzt wird)</a:t>
-            </a:r>
+              <a:t>hhhh</a:t>
+            </a:r>
+            <a:r>
+              <a:rPr lang="de-DE" dirty="0" smtClean="0"/>
+              <a:t> </a:t>
+            </a:r>
+            <a:r>
+              <a:rPr lang="de-DE" dirty="0" smtClean="0"/>
+              <a:t>durch die hexadezimale Zahl aus der </a:t>
+            </a:r>
+            <a:r>
+              <a:rPr lang="de-DE" smtClean="0"/>
+              <a:t>Tabelle </a:t>
+            </a:r>
+            <a:r>
+              <a:rPr lang="de-DE" smtClean="0"/>
+              <a:t>ersetzen)</a:t>
+            </a:r>
+            <a:endParaRPr lang="de-DE" dirty="0" smtClean="0"/>
           </a:p>
           <a:p>
             <a:pPr lvl="1"/>
@@ -16522,6 +16517,13 @@
       </p:transition>
     </mc:Fallback>
   </mc:AlternateContent>
+  <p:timing>
+    <p:tnLst>
+      <p:par>
+        <p:cTn id="1" dur="indefinite" restart="never" nodeType="tmRoot"/>
+      </p:par>
+    </p:tnLst>
+  </p:timing>
 </p:sld>
 </file>
 
@@ -18161,11 +18163,7 @@
             <a:pPr lvl="1"/>
             <a:r>
               <a:rPr lang="de-DE" dirty="0" smtClean="0"/>
-              <a:t>prozedural („alles ist ein Algorithmus“, z.B. eine Funktion</a:t>
-            </a:r>
-            <a:r>
-              <a:rPr lang="de-DE" dirty="0" smtClean="0"/>
-              <a:t>)</a:t>
+              <a:t>prozedural („alles ist ein Algorithmus“, z.B. eine Funktion)</a:t>
             </a:r>
           </a:p>
           <a:p>
@@ -18199,7 +18197,6 @@
               <a:rPr lang="de-DE" dirty="0" smtClean="0"/>
               <a:t>Vorteil: plattformunabhängig</a:t>
             </a:r>
-            <a:endParaRPr lang="de-DE" dirty="0" smtClean="0"/>
           </a:p>
           <a:p>
             <a:endParaRPr lang="de-DE" dirty="0"/>
@@ -18362,7 +18359,6 @@
               <a:rPr lang="de-DE" dirty="0" smtClean="0"/>
               <a:t>Name stammt jedoch von Monty Python</a:t>
             </a:r>
-            <a:endParaRPr lang="de-DE" dirty="0" smtClean="0"/>
           </a:p>
           <a:p>
             <a:endParaRPr lang="de-DE" dirty="0"/>

</xml_diff>